<commit_message>
update slides with prototype 2
</commit_message>
<xml_diff>
--- a/docs/slides.pptx
+++ b/docs/slides.pptx
@@ -5,14 +5,16 @@
     <p:sldMasterId id="2147483648" r:id="rId1"/>
   </p:sldMasterIdLst>
   <p:notesMasterIdLst>
-    <p:notesMasterId r:id="rId5"/>
+    <p:notesMasterId r:id="rId7"/>
   </p:notesMasterIdLst>
   <p:handoutMasterIdLst>
-    <p:handoutMasterId r:id="rId6"/>
+    <p:handoutMasterId r:id="rId8"/>
   </p:handoutMasterIdLst>
   <p:sldIdLst>
     <p:sldId id="258" r:id="rId3"/>
     <p:sldId id="259" r:id="rId4"/>
+    <p:sldId id="260" r:id="rId5"/>
+    <p:sldId id="261" r:id="rId6"/>
   </p:sldIdLst>
   <p:sldSz cx="12192000" cy="6858000"/>
   <p:notesSz cx="7103745" cy="10234295"/>
@@ -3935,6 +3937,360 @@
               <a:t>FASTQ size was reduced by 8 % on average</a:t>
             </a:r>
             <a:endParaRPr lang="en-US"/>
+          </a:p>
+        </p:txBody>
+      </p:sp>
+    </p:spTree>
+  </p:cSld>
+  <p:clrMapOvr>
+    <a:masterClrMapping/>
+  </p:clrMapOvr>
+</p:sld>
+</file>
+
+<file path=ppt/slides/slide3.xml><?xml version="1.0" encoding="utf-8"?>
+<p:sld xmlns:a="http://schemas.openxmlformats.org/drawingml/2006/main" xmlns:r="http://schemas.openxmlformats.org/officeDocument/2006/relationships" xmlns:p="http://schemas.openxmlformats.org/presentationml/2006/main">
+  <p:cSld>
+    <p:spTree>
+      <p:nvGrpSpPr>
+        <p:cNvPr id="1" name=""/>
+        <p:cNvGrpSpPr/>
+        <p:nvPr/>
+      </p:nvGrpSpPr>
+      <p:grpSpPr/>
+      <p:sp>
+        <p:nvSpPr>
+          <p:cNvPr id="2" name="Title 1"/>
+          <p:cNvSpPr>
+            <a:spLocks noGrp="1"/>
+          </p:cNvSpPr>
+          <p:nvPr>
+            <p:ph type="title"/>
+          </p:nvPr>
+        </p:nvSpPr>
+        <p:spPr/>
+        <p:txBody>
+          <a:bodyPr/>
+          <a:p>
+            <a:r>
+              <a:rPr lang="en-US"/>
+              <a:t>Prototype 2: quantify the impact of mixing gene annotations and approach to minimise its impact</a:t>
+            </a:r>
+            <a:endParaRPr lang="en-US"/>
+          </a:p>
+        </p:txBody>
+      </p:sp>
+      <p:sp>
+        <p:nvSpPr>
+          <p:cNvPr id="13" name="Content Placeholder 12"/>
+          <p:cNvSpPr>
+            <a:spLocks noGrp="1"/>
+          </p:cNvSpPr>
+          <p:nvPr>
+            <p:ph idx="1"/>
+          </p:nvPr>
+        </p:nvSpPr>
+        <p:spPr/>
+        <p:txBody>
+          <a:bodyPr/>
+          <a:p>
+            <a:r>
+              <a:rPr lang="en-US" b="1"/>
+              <a:t>Baseline approach</a:t>
+            </a:r>
+            <a:r>
+              <a:rPr lang="en-US"/>
+              <a:t>: map genes based on the gene id</a:t>
+            </a:r>
+            <a:endParaRPr lang="en-US"/>
+          </a:p>
+          <a:p>
+            <a:pPr lvl="1"/>
+            <a:r>
+              <a:rPr lang="en-US"/>
+              <a:t>Limitations</a:t>
+            </a:r>
+            <a:endParaRPr lang="en-US"/>
+          </a:p>
+          <a:p>
+            <a:pPr lvl="2"/>
+            <a:r>
+              <a:rPr lang="en-US"/>
+              <a:t>Gene ids change</a:t>
+            </a:r>
+            <a:endParaRPr lang="en-US"/>
+          </a:p>
+          <a:p>
+            <a:pPr lvl="2"/>
+            <a:r>
+              <a:rPr lang="en-US"/>
+              <a:t>Gene models identified under the same gene id also change</a:t>
+            </a:r>
+            <a:endParaRPr lang="en-US"/>
+          </a:p>
+          <a:p>
+            <a:pPr lvl="0"/>
+            <a:r>
+              <a:rPr lang="en-US" b="1"/>
+              <a:t>Hypothesis</a:t>
+            </a:r>
+            <a:r>
+              <a:rPr lang="en-US"/>
+              <a:t>: comparing two or more gene annotation versions we will be able to identify those genes that have identical gene and transcripts models and hence 1) quantify the difference between two or more gene annotations and 2) identify a subset of genes that can be jointly analysed using different gene annotations without the need for upstream reanalysis</a:t>
+            </a:r>
+            <a:endParaRPr lang="en-US"/>
+          </a:p>
+          <a:p>
+            <a:pPr lvl="0"/>
+            <a:r>
+              <a:rPr lang="en-US" b="1"/>
+              <a:t>Approach</a:t>
+            </a:r>
+            <a:r>
+              <a:rPr lang="en-US"/>
+              <a:t>: two genes are considered identical when the start and end coordinates of the gene and every exon of every transcript are identical. This approach is identified agnostic. </a:t>
+            </a:r>
+            <a:endParaRPr lang="en-US"/>
+          </a:p>
+          <a:p>
+            <a:pPr lvl="1"/>
+            <a:r>
+              <a:rPr lang="en-US"/>
+              <a:t>Gene coordinates are matched by exact match</a:t>
+            </a:r>
+            <a:endParaRPr lang="en-US"/>
+          </a:p>
+          <a:p>
+            <a:pPr lvl="1"/>
+            <a:r>
+              <a:rPr lang="en-US"/>
+              <a:t>Exon coordinates are matched using a hash after sorting all of them</a:t>
+            </a:r>
+            <a:endParaRPr lang="en-US"/>
+          </a:p>
+        </p:txBody>
+      </p:sp>
+    </p:spTree>
+  </p:cSld>
+  <p:clrMapOvr>
+    <a:masterClrMapping/>
+  </p:clrMapOvr>
+</p:sld>
+</file>
+
+<file path=ppt/slides/slide4.xml><?xml version="1.0" encoding="utf-8"?>
+<p:sld xmlns:a="http://schemas.openxmlformats.org/drawingml/2006/main" xmlns:r="http://schemas.openxmlformats.org/officeDocument/2006/relationships" xmlns:p="http://schemas.openxmlformats.org/presentationml/2006/main">
+  <p:cSld>
+    <p:spTree>
+      <p:nvGrpSpPr>
+        <p:cNvPr id="1" name=""/>
+        <p:cNvGrpSpPr/>
+        <p:nvPr/>
+      </p:nvGrpSpPr>
+      <p:grpSpPr/>
+      <p:sp>
+        <p:nvSpPr>
+          <p:cNvPr id="2" name="Title 1"/>
+          <p:cNvSpPr>
+            <a:spLocks noGrp="1"/>
+          </p:cNvSpPr>
+          <p:nvPr>
+            <p:ph type="title"/>
+          </p:nvPr>
+        </p:nvSpPr>
+        <p:spPr/>
+        <p:txBody>
+          <a:bodyPr/>
+          <a:p>
+            <a:r>
+              <a:rPr lang="en-US"/>
+              <a:t>Prototype 2: quantify the impact of mixing gene annotations and approach to minimise its impact</a:t>
+            </a:r>
+            <a:endParaRPr lang="en-US"/>
+          </a:p>
+        </p:txBody>
+      </p:sp>
+      <p:pic>
+        <p:nvPicPr>
+          <p:cNvPr id="7" name="Picture 6"/>
+          <p:cNvPicPr>
+            <a:picLocks noChangeAspect="1"/>
+          </p:cNvPicPr>
+          <p:nvPr/>
+        </p:nvPicPr>
+        <p:blipFill>
+          <a:blip r:embed="rId1"/>
+          <a:stretch>
+            <a:fillRect/>
+          </a:stretch>
+        </p:blipFill>
+        <p:spPr>
+          <a:xfrm>
+            <a:off x="6128385" y="2117090"/>
+            <a:ext cx="5485765" cy="3287395"/>
+          </a:xfrm>
+          <a:prstGeom prst="rect">
+            <a:avLst/>
+          </a:prstGeom>
+        </p:spPr>
+      </p:pic>
+      <p:sp>
+        <p:nvSpPr>
+          <p:cNvPr id="8" name="Text Box 7"/>
+          <p:cNvSpPr txBox="1"/>
+          <p:nvPr/>
+        </p:nvSpPr>
+        <p:spPr>
+          <a:xfrm>
+            <a:off x="1458595" y="5637530"/>
+            <a:ext cx="3023235" cy="1198880"/>
+          </a:xfrm>
+          <a:prstGeom prst="rect">
+            <a:avLst/>
+          </a:prstGeom>
+          <a:noFill/>
+        </p:spPr>
+        <p:txBody>
+          <a:bodyPr wrap="none" rtlCol="0">
+            <a:spAutoFit/>
+          </a:bodyPr>
+          <a:p>
+            <a:pPr algn="l"/>
+            <a:r>
+              <a:rPr lang="en-US" sz="1200"/>
+              <a:t>Matching gene ids: 3219</a:t>
+            </a:r>
+            <a:endParaRPr lang="en-US" sz="1200"/>
+          </a:p>
+          <a:p>
+            <a:pPr algn="l"/>
+            <a:r>
+              <a:rPr lang="en-US" sz="1200"/>
+              <a:t>Jaccard by matching gene ids: 0.94</a:t>
+            </a:r>
+            <a:endParaRPr lang="en-US" sz="1200"/>
+          </a:p>
+          <a:p>
+            <a:pPr algn="l"/>
+            <a:r>
+              <a:rPr lang="en-US" sz="1200"/>
+              <a:t>Identical genes: 1235</a:t>
+            </a:r>
+            <a:endParaRPr lang="en-US" sz="1200"/>
+          </a:p>
+          <a:p>
+            <a:pPr algn="l"/>
+            <a:r>
+              <a:rPr lang="en-US" sz="1200"/>
+              <a:t>Identical genes with different ids : 13</a:t>
+            </a:r>
+            <a:endParaRPr lang="en-US" sz="1200"/>
+          </a:p>
+          <a:p>
+            <a:pPr algn="l"/>
+            <a:r>
+              <a:rPr lang="en-US" sz="1200"/>
+              <a:t>Jaccard by exact model: 0.23</a:t>
+            </a:r>
+            <a:endParaRPr lang="en-US" sz="1200"/>
+          </a:p>
+          <a:p>
+            <a:pPr algn="l"/>
+            <a:endParaRPr lang="en-US" sz="1200"/>
+          </a:p>
+        </p:txBody>
+      </p:sp>
+      <p:pic>
+        <p:nvPicPr>
+          <p:cNvPr id="10" name="Content Placeholder 9"/>
+          <p:cNvPicPr>
+            <a:picLocks noChangeAspect="1"/>
+          </p:cNvPicPr>
+          <p:nvPr>
+            <p:ph idx="1"/>
+          </p:nvPr>
+        </p:nvPicPr>
+        <p:blipFill>
+          <a:blip r:embed="rId2"/>
+          <a:stretch>
+            <a:fillRect/>
+          </a:stretch>
+        </p:blipFill>
+        <p:spPr>
+          <a:xfrm>
+            <a:off x="647700" y="2117090"/>
+            <a:ext cx="5411470" cy="3292475"/>
+          </a:xfrm>
+          <a:prstGeom prst="rect">
+            <a:avLst/>
+          </a:prstGeom>
+        </p:spPr>
+      </p:pic>
+      <p:sp>
+        <p:nvSpPr>
+          <p:cNvPr id="11" name="Text Box 10"/>
+          <p:cNvSpPr txBox="1"/>
+          <p:nvPr/>
+        </p:nvSpPr>
+        <p:spPr>
+          <a:xfrm>
+            <a:off x="6987540" y="5637530"/>
+            <a:ext cx="2926080" cy="1198880"/>
+          </a:xfrm>
+          <a:prstGeom prst="rect">
+            <a:avLst/>
+          </a:prstGeom>
+          <a:noFill/>
+        </p:spPr>
+        <p:txBody>
+          <a:bodyPr wrap="none" rtlCol="0">
+            <a:spAutoFit/>
+          </a:bodyPr>
+          <a:p>
+            <a:pPr algn="l"/>
+            <a:r>
+              <a:rPr lang="en-US" sz="1200"/>
+              <a:t>Matching gene ids: 3361</a:t>
+            </a:r>
+            <a:endParaRPr lang="en-US" sz="1200"/>
+          </a:p>
+          <a:p>
+            <a:pPr algn="l"/>
+            <a:r>
+              <a:rPr lang="en-US" sz="1200"/>
+              <a:t>Jaccard by matching gene ids: 1.0</a:t>
+            </a:r>
+            <a:endParaRPr lang="en-US" sz="1200"/>
+          </a:p>
+          <a:p>
+            <a:pPr algn="l"/>
+            <a:r>
+              <a:rPr lang="en-US" sz="1200"/>
+              <a:t>Identical genes: 3347</a:t>
+            </a:r>
+            <a:endParaRPr lang="en-US" sz="1200"/>
+          </a:p>
+          <a:p>
+            <a:pPr algn="l"/>
+            <a:r>
+              <a:rPr lang="en-US" sz="1200">
+                <a:sym typeface="+mn-ea"/>
+              </a:rPr>
+              <a:t>Identical genes with different ids : 0</a:t>
+            </a:r>
+            <a:endParaRPr lang="en-US" sz="1200"/>
+          </a:p>
+          <a:p>
+            <a:pPr algn="l"/>
+            <a:r>
+              <a:rPr lang="en-US" sz="1200"/>
+              <a:t>Jaccard by exact model: 0.99</a:t>
+            </a:r>
+            <a:endParaRPr lang="en-US" sz="1200"/>
+          </a:p>
+          <a:p>
+            <a:pPr algn="l"/>
+            <a:endParaRPr lang="en-US" sz="1200"/>
           </a:p>
         </p:txBody>
       </p:sp>

</xml_diff>